<commit_message>
corrigindo diagrama interface interna
</commit_message>
<xml_diff>
--- a/26 - Descrição das Interfaces Internas .pptx
+++ b/26 - Descrição das Interfaces Internas .pptx
@@ -104,6 +104,11 @@
       </a:defRPr>
     </a:lvl9pPr>
   </p:defaultTextStyle>
+  <p:extLst>
+    <p:ext uri="{EFAFB233-063F-42B5-8137-9DF3F51BA10A}">
+      <p15:sldGuideLst xmlns:p15="http://schemas.microsoft.com/office/powerpoint/2012/main"/>
+    </p:ext>
+  </p:extLst>
 </p:presentation>
 </file>
 
@@ -111,6 +116,7 @@
 <p1510:revInfo xmlns:a="http://schemas.openxmlformats.org/drawingml/2006/main" xmlns:r="http://schemas.openxmlformats.org/officeDocument/2006/relationships" xmlns:p1510="http://schemas.microsoft.com/office/powerpoint/2015/10/main">
   <p1510:revLst>
     <p1510:client id="{20453E7E-1D61-47CC-9A5C-4D580D1DAE53}" v="1" dt="2020-11-09T18:05:52.182"/>
+    <p1510:client id="{A82A04EE-B4EF-4355-92BE-8490430EA8C1}" v="2" dt="2020-11-09T20:59:58.474"/>
   </p1510:revLst>
 </p1510:revInfo>
 </file>
@@ -152,6 +158,46 @@
             <pc:docMk/>
             <pc:sldMk cId="2468403919" sldId="256"/>
             <ac:picMk id="5" creationId="{74B12896-694E-499E-B928-63883A815512}"/>
+          </ac:picMkLst>
+        </pc:picChg>
+      </pc:sldChg>
+    </pc:docChg>
+  </pc:docChgLst>
+  <pc:docChgLst>
+    <pc:chgData name="Rafael Izukawa" userId="8cd3af5bce398e7e" providerId="LiveId" clId="{A82A04EE-B4EF-4355-92BE-8490430EA8C1}"/>
+    <pc:docChg chg="custSel modSld">
+      <pc:chgData name="Rafael Izukawa" userId="8cd3af5bce398e7e" providerId="LiveId" clId="{A82A04EE-B4EF-4355-92BE-8490430EA8C1}" dt="2020-11-09T21:00:08.838" v="12" actId="14100"/>
+      <pc:docMkLst>
+        <pc:docMk/>
+      </pc:docMkLst>
+      <pc:sldChg chg="addSp delSp modSp mod">
+        <pc:chgData name="Rafael Izukawa" userId="8cd3af5bce398e7e" providerId="LiveId" clId="{A82A04EE-B4EF-4355-92BE-8490430EA8C1}" dt="2020-11-09T21:00:08.838" v="12" actId="14100"/>
+        <pc:sldMkLst>
+          <pc:docMk/>
+          <pc:sldMk cId="2468403919" sldId="256"/>
+        </pc:sldMkLst>
+        <pc:picChg chg="add del mod">
+          <ac:chgData name="Rafael Izukawa" userId="8cd3af5bce398e7e" providerId="LiveId" clId="{A82A04EE-B4EF-4355-92BE-8490430EA8C1}" dt="2020-11-09T20:58:50.247" v="7" actId="478"/>
+          <ac:picMkLst>
+            <pc:docMk/>
+            <pc:sldMk cId="2468403919" sldId="256"/>
+            <ac:picMk id="3" creationId="{04580A34-93EA-48EF-8C45-9BC3F2F0C29F}"/>
+          </ac:picMkLst>
+        </pc:picChg>
+        <pc:picChg chg="del">
+          <ac:chgData name="Rafael Izukawa" userId="8cd3af5bce398e7e" providerId="LiveId" clId="{A82A04EE-B4EF-4355-92BE-8490430EA8C1}" dt="2020-11-09T20:57:53.858" v="0" actId="478"/>
+          <ac:picMkLst>
+            <pc:docMk/>
+            <pc:sldMk cId="2468403919" sldId="256"/>
+            <ac:picMk id="5" creationId="{74B12896-694E-499E-B928-63883A815512}"/>
+          </ac:picMkLst>
+        </pc:picChg>
+        <pc:picChg chg="add mod">
+          <ac:chgData name="Rafael Izukawa" userId="8cd3af5bce398e7e" providerId="LiveId" clId="{A82A04EE-B4EF-4355-92BE-8490430EA8C1}" dt="2020-11-09T21:00:08.838" v="12" actId="14100"/>
+          <ac:picMkLst>
+            <pc:docMk/>
+            <pc:sldMk cId="2468403919" sldId="256"/>
+            <ac:picMk id="6" creationId="{5C70F337-A852-4F88-9B31-4F12B7EC29EB}"/>
           </ac:picMkLst>
         </pc:picChg>
       </pc:sldChg>
@@ -3376,10 +3422,10 @@
       </p:grpSpPr>
       <p:pic>
         <p:nvPicPr>
-          <p:cNvPr id="5" name="Imagem 4" descr="Interface gráfica do usuário&#10;&#10;Descrição gerada automaticamente">
-            <a:extLst>
-              <a:ext uri="{FF2B5EF4-FFF2-40B4-BE49-F238E27FC236}">
-                <a16:creationId xmlns:a16="http://schemas.microsoft.com/office/drawing/2014/main" id="{74B12896-694E-499E-B928-63883A815512}"/>
+          <p:cNvPr id="6" name="Imagem 5" descr="Interface gráfica do usuário&#10;&#10;Descrição gerada automaticamente">
+            <a:extLst>
+              <a:ext uri="{FF2B5EF4-FFF2-40B4-BE49-F238E27FC236}">
+                <a16:creationId xmlns:a16="http://schemas.microsoft.com/office/drawing/2014/main" id="{5C70F337-A852-4F88-9B31-4F12B7EC29EB}"/>
               </a:ext>
             </a:extLst>
           </p:cNvPr>
@@ -3402,8 +3448,8 @@
         </p:blipFill>
         <p:spPr>
           <a:xfrm>
-            <a:off x="66676" y="0"/>
-            <a:ext cx="12030074" cy="6858000"/>
+            <a:off x="65314" y="0"/>
+            <a:ext cx="12055151" cy="6858000"/>
           </a:xfrm>
           <a:prstGeom prst="rect">
             <a:avLst/>

</xml_diff>